<commit_message>
Adding CMAD presentation -ver2
</commit_message>
<xml_diff>
--- a/DeviceManager/CMAD_prezo.pptx
+++ b/DeviceManager/CMAD_prezo.pptx
@@ -16,6 +16,8 @@
     <p:sldId id="263" r:id="rId10"/>
     <p:sldId id="265" r:id="rId11"/>
     <p:sldId id="266" r:id="rId12"/>
+    <p:sldId id="268" r:id="rId13"/>
+    <p:sldId id="267" r:id="rId14"/>
   </p:sldIdLst>
   <p:sldSz cx="12192000" cy="6858000"/>
   <p:notesSz cx="6858000" cy="9144000"/>
@@ -4100,6 +4102,565 @@
 </p:sld>
 </file>
 
+<file path=ppt/slides/slide12.xml><?xml version="1.0" encoding="utf-8"?>
+<p:sld xmlns:a="http://schemas.openxmlformats.org/drawingml/2006/main" xmlns:r="http://schemas.openxmlformats.org/officeDocument/2006/relationships" xmlns:p="http://schemas.openxmlformats.org/presentationml/2006/main">
+  <p:cSld>
+    <p:spTree>
+      <p:nvGrpSpPr>
+        <p:cNvPr id="1" name=""/>
+        <p:cNvGrpSpPr/>
+        <p:nvPr/>
+      </p:nvGrpSpPr>
+      <p:grpSpPr>
+        <a:xfrm>
+          <a:off x="0" y="0"/>
+          <a:ext cx="0" cy="0"/>
+          <a:chOff x="0" y="0"/>
+          <a:chExt cx="0" cy="0"/>
+        </a:xfrm>
+      </p:grpSpPr>
+      <p:sp>
+        <p:nvSpPr>
+          <p:cNvPr id="2" name="Title 1"/>
+          <p:cNvSpPr>
+            <a:spLocks noGrp="1"/>
+          </p:cNvSpPr>
+          <p:nvPr>
+            <p:ph type="title"/>
+          </p:nvPr>
+        </p:nvSpPr>
+        <p:spPr/>
+        <p:txBody>
+          <a:bodyPr/>
+          <a:lstStyle/>
+          <a:p>
+            <a:r>
+              <a:rPr lang="en-US" dirty="0" smtClean="0"/>
+              <a:t>React JS Components</a:t>
+            </a:r>
+            <a:endParaRPr lang="en-US" dirty="0"/>
+          </a:p>
+        </p:txBody>
+      </p:sp>
+      <p:sp>
+        <p:nvSpPr>
+          <p:cNvPr id="3" name="Content Placeholder 2"/>
+          <p:cNvSpPr>
+            <a:spLocks noGrp="1"/>
+          </p:cNvSpPr>
+          <p:nvPr>
+            <p:ph idx="1"/>
+          </p:nvPr>
+        </p:nvSpPr>
+        <p:spPr/>
+        <p:txBody>
+          <a:bodyPr>
+            <a:normAutofit fontScale="85000" lnSpcReduction="20000"/>
+          </a:bodyPr>
+          <a:lstStyle/>
+          <a:p>
+            <a:pPr marL="0" indent="0">
+              <a:buNone/>
+            </a:pPr>
+            <a:r>
+              <a:rPr lang="en-US" dirty="0" smtClean="0"/>
+              <a:t>Class App extends </a:t>
+            </a:r>
+            <a:r>
+              <a:rPr lang="en-US" dirty="0" err="1" smtClean="0"/>
+              <a:t>React.Component</a:t>
+            </a:r>
+            <a:r>
+              <a:rPr lang="en-US" dirty="0" smtClean="0"/>
+              <a:t> {</a:t>
+            </a:r>
+          </a:p>
+          <a:p>
+            <a:pPr marL="0" indent="0">
+              <a:buNone/>
+            </a:pPr>
+            <a:r>
+              <a:rPr lang="en-US" dirty="0" smtClean="0"/>
+              <a:t>Render()</a:t>
+            </a:r>
+          </a:p>
+          <a:p>
+            <a:pPr marL="0" indent="0">
+              <a:buNone/>
+            </a:pPr>
+            <a:r>
+              <a:rPr lang="en-US" dirty="0"/>
+              <a:t> </a:t>
+            </a:r>
+            <a:r>
+              <a:rPr lang="en-US" dirty="0" smtClean="0"/>
+              <a:t>  return</a:t>
+            </a:r>
+          </a:p>
+          <a:p>
+            <a:pPr marL="0" indent="0">
+              <a:buNone/>
+            </a:pPr>
+            <a:r>
+              <a:rPr lang="en-US" dirty="0"/>
+              <a:t> </a:t>
+            </a:r>
+            <a:r>
+              <a:rPr lang="en-US" dirty="0" smtClean="0"/>
+              <a:t>     &lt;div&gt; </a:t>
+            </a:r>
+          </a:p>
+          <a:p>
+            <a:pPr marL="0" indent="0">
+              <a:buNone/>
+            </a:pPr>
+            <a:r>
+              <a:rPr lang="en-US" dirty="0"/>
+              <a:t> </a:t>
+            </a:r>
+            <a:r>
+              <a:rPr lang="en-US" dirty="0" smtClean="0"/>
+              <a:t>          &lt;Header /&gt;</a:t>
+            </a:r>
+          </a:p>
+          <a:p>
+            <a:pPr marL="0" indent="0">
+              <a:buNone/>
+            </a:pPr>
+            <a:r>
+              <a:rPr lang="en-US" dirty="0"/>
+              <a:t>	</a:t>
+            </a:r>
+            <a:r>
+              <a:rPr lang="en-US" dirty="0" smtClean="0"/>
+              <a:t>&lt;</a:t>
+            </a:r>
+            <a:r>
+              <a:rPr lang="en-US" dirty="0" smtClean="0"/>
+              <a:t> </a:t>
+            </a:r>
+            <a:r>
+              <a:rPr lang="en-US" dirty="0" err="1" smtClean="0"/>
+              <a:t>MessageStats</a:t>
+            </a:r>
+            <a:r>
+              <a:rPr lang="en-US" dirty="0" smtClean="0"/>
+              <a:t> /&gt;</a:t>
+            </a:r>
+          </a:p>
+          <a:p>
+            <a:pPr marL="0" indent="0">
+              <a:buNone/>
+            </a:pPr>
+            <a:r>
+              <a:rPr lang="en-US" dirty="0"/>
+              <a:t> </a:t>
+            </a:r>
+            <a:r>
+              <a:rPr lang="en-US" dirty="0" smtClean="0"/>
+              <a:t>   	&lt; </a:t>
+            </a:r>
+            <a:r>
+              <a:rPr lang="en-US" dirty="0" err="1" smtClean="0"/>
+              <a:t>MessageFilter</a:t>
+            </a:r>
+            <a:r>
+              <a:rPr lang="en-US" dirty="0" smtClean="0"/>
+              <a:t> /&gt;</a:t>
+            </a:r>
+          </a:p>
+          <a:p>
+            <a:pPr marL="0" indent="0">
+              <a:buNone/>
+            </a:pPr>
+            <a:r>
+              <a:rPr lang="en-US" dirty="0"/>
+              <a:t>	</a:t>
+            </a:r>
+            <a:r>
+              <a:rPr lang="en-US" dirty="0" smtClean="0"/>
+              <a:t>&lt;</a:t>
+            </a:r>
+            <a:r>
+              <a:rPr lang="en-US" dirty="0" err="1" smtClean="0"/>
+              <a:t>MessageScroll</a:t>
+            </a:r>
+            <a:r>
+              <a:rPr lang="en-US" dirty="0" smtClean="0"/>
+              <a:t> /&gt;</a:t>
+            </a:r>
+          </a:p>
+          <a:p>
+            <a:pPr marL="0" indent="0">
+              <a:buNone/>
+            </a:pPr>
+            <a:r>
+              <a:rPr lang="en-US" dirty="0"/>
+              <a:t> </a:t>
+            </a:r>
+            <a:r>
+              <a:rPr lang="en-US" dirty="0" smtClean="0"/>
+              <a:t>    &lt;/div&gt;</a:t>
+            </a:r>
+          </a:p>
+          <a:p>
+            <a:pPr marL="0" indent="0">
+              <a:buNone/>
+            </a:pPr>
+            <a:r>
+              <a:rPr lang="en-US" dirty="0"/>
+              <a:t>}</a:t>
+            </a:r>
+            <a:endParaRPr lang="en-US" dirty="0" smtClean="0"/>
+          </a:p>
+          <a:p>
+            <a:pPr marL="0" indent="0">
+              <a:buNone/>
+            </a:pPr>
+            <a:r>
+              <a:rPr lang="en-US" dirty="0"/>
+              <a:t> </a:t>
+            </a:r>
+            <a:r>
+              <a:rPr lang="en-US" dirty="0" smtClean="0"/>
+              <a:t>        </a:t>
+            </a:r>
+            <a:endParaRPr lang="en-US" dirty="0"/>
+          </a:p>
+        </p:txBody>
+      </p:sp>
+    </p:spTree>
+    <p:extLst>
+      <p:ext uri="{BB962C8B-B14F-4D97-AF65-F5344CB8AC3E}">
+        <p14:creationId xmlns:p14="http://schemas.microsoft.com/office/powerpoint/2010/main" val="1853185166"/>
+      </p:ext>
+    </p:extLst>
+  </p:cSld>
+  <p:clrMapOvr>
+    <a:masterClrMapping/>
+  </p:clrMapOvr>
+</p:sld>
+</file>
+
+<file path=ppt/slides/slide13.xml><?xml version="1.0" encoding="utf-8"?>
+<p:sld xmlns:a="http://schemas.openxmlformats.org/drawingml/2006/main" xmlns:r="http://schemas.openxmlformats.org/officeDocument/2006/relationships" xmlns:p="http://schemas.openxmlformats.org/presentationml/2006/main">
+  <p:cSld>
+    <p:spTree>
+      <p:nvGrpSpPr>
+        <p:cNvPr id="1" name=""/>
+        <p:cNvGrpSpPr/>
+        <p:nvPr/>
+      </p:nvGrpSpPr>
+      <p:grpSpPr>
+        <a:xfrm>
+          <a:off x="0" y="0"/>
+          <a:ext cx="0" cy="0"/>
+          <a:chOff x="0" y="0"/>
+          <a:chExt cx="0" cy="0"/>
+        </a:xfrm>
+      </p:grpSpPr>
+      <p:sp>
+        <p:nvSpPr>
+          <p:cNvPr id="2" name="Title 1"/>
+          <p:cNvSpPr>
+            <a:spLocks noGrp="1"/>
+          </p:cNvSpPr>
+          <p:nvPr>
+            <p:ph type="title"/>
+          </p:nvPr>
+        </p:nvSpPr>
+        <p:spPr/>
+        <p:txBody>
+          <a:bodyPr/>
+          <a:lstStyle/>
+          <a:p>
+            <a:r>
+              <a:rPr lang="en-US" dirty="0" smtClean="0"/>
+              <a:t>React Component Classes</a:t>
+            </a:r>
+            <a:endParaRPr lang="en-US" dirty="0"/>
+          </a:p>
+        </p:txBody>
+      </p:sp>
+      <p:sp>
+        <p:nvSpPr>
+          <p:cNvPr id="3" name="Content Placeholder 2"/>
+          <p:cNvSpPr>
+            <a:spLocks noGrp="1"/>
+          </p:cNvSpPr>
+          <p:nvPr>
+            <p:ph idx="1"/>
+          </p:nvPr>
+        </p:nvSpPr>
+        <p:spPr/>
+        <p:txBody>
+          <a:bodyPr>
+            <a:normAutofit fontScale="77500" lnSpcReduction="20000"/>
+          </a:bodyPr>
+          <a:lstStyle/>
+          <a:p>
+            <a:pPr marL="0" indent="0">
+              <a:buNone/>
+            </a:pPr>
+            <a:r>
+              <a:rPr lang="en-US" dirty="0" smtClean="0"/>
+              <a:t>Class </a:t>
+            </a:r>
+            <a:r>
+              <a:rPr lang="en-US" dirty="0" err="1" smtClean="0"/>
+              <a:t>CMADApp</a:t>
+            </a:r>
+            <a:r>
+              <a:rPr lang="en-US" dirty="0" smtClean="0"/>
+              <a:t> extends </a:t>
+            </a:r>
+            <a:r>
+              <a:rPr lang="en-US" dirty="0" err="1" smtClean="0"/>
+              <a:t>React.Component</a:t>
+            </a:r>
+            <a:r>
+              <a:rPr lang="en-US" dirty="0" smtClean="0"/>
+              <a:t>{</a:t>
+            </a:r>
+          </a:p>
+          <a:p>
+            <a:pPr marL="0" indent="0">
+              <a:buNone/>
+            </a:pPr>
+            <a:r>
+              <a:rPr lang="en-US" dirty="0"/>
+              <a:t> </a:t>
+            </a:r>
+            <a:r>
+              <a:rPr lang="en-US" dirty="0" smtClean="0"/>
+              <a:t>     constructor(props){</a:t>
+            </a:r>
+          </a:p>
+          <a:p>
+            <a:pPr marL="0" indent="0">
+              <a:buNone/>
+            </a:pPr>
+            <a:r>
+              <a:rPr lang="en-US" dirty="0"/>
+              <a:t> </a:t>
+            </a:r>
+            <a:r>
+              <a:rPr lang="en-US" dirty="0" smtClean="0"/>
+              <a:t>       super(props)</a:t>
+            </a:r>
+          </a:p>
+          <a:p>
+            <a:pPr marL="0" indent="0">
+              <a:buNone/>
+            </a:pPr>
+            <a:r>
+              <a:rPr lang="en-US" dirty="0"/>
+              <a:t> </a:t>
+            </a:r>
+            <a:r>
+              <a:rPr lang="en-US" dirty="0" smtClean="0"/>
+              <a:t>       </a:t>
+            </a:r>
+            <a:r>
+              <a:rPr lang="en-US" dirty="0" err="1" smtClean="0"/>
+              <a:t>this.messages</a:t>
+            </a:r>
+            <a:r>
+              <a:rPr lang="en-US" dirty="0" smtClean="0"/>
+              <a:t> = &lt;List of messages&gt;</a:t>
+            </a:r>
+          </a:p>
+          <a:p>
+            <a:pPr marL="0" indent="0">
+              <a:buNone/>
+            </a:pPr>
+            <a:r>
+              <a:rPr lang="en-US" dirty="0"/>
+              <a:t> </a:t>
+            </a:r>
+            <a:r>
+              <a:rPr lang="en-US" dirty="0" smtClean="0"/>
+              <a:t>     }</a:t>
+            </a:r>
+          </a:p>
+          <a:p>
+            <a:pPr marL="0" indent="0">
+              <a:buNone/>
+            </a:pPr>
+            <a:r>
+              <a:rPr lang="en-US" dirty="0"/>
+              <a:t> </a:t>
+            </a:r>
+            <a:r>
+              <a:rPr lang="en-US" dirty="0" smtClean="0"/>
+              <a:t>     Class Header </a:t>
+            </a:r>
+            <a:r>
+              <a:rPr lang="en-US" dirty="0" smtClean="0"/>
+              <a:t>extends </a:t>
+            </a:r>
+            <a:r>
+              <a:rPr lang="en-US" dirty="0" err="1" smtClean="0"/>
+              <a:t>React.Component</a:t>
+            </a:r>
+            <a:r>
+              <a:rPr lang="en-US" dirty="0" smtClean="0"/>
+              <a:t>{  #“static header”}</a:t>
+            </a:r>
+          </a:p>
+          <a:p>
+            <a:pPr marL="0" indent="0">
+              <a:buNone/>
+            </a:pPr>
+            <a:r>
+              <a:rPr lang="en-US" dirty="0"/>
+              <a:t> </a:t>
+            </a:r>
+            <a:r>
+              <a:rPr lang="en-US" dirty="0" smtClean="0"/>
+              <a:t>     Class </a:t>
+            </a:r>
+            <a:r>
+              <a:rPr lang="en-US" dirty="0" err="1" smtClean="0"/>
+              <a:t>MessageStats</a:t>
+            </a:r>
+            <a:r>
+              <a:rPr lang="en-US" dirty="0" smtClean="0"/>
+              <a:t> </a:t>
+            </a:r>
+            <a:r>
+              <a:rPr lang="en-US" dirty="0" smtClean="0"/>
+              <a:t>extends </a:t>
+            </a:r>
+            <a:r>
+              <a:rPr lang="en-US" dirty="0" err="1" smtClean="0"/>
+              <a:t>React.Component</a:t>
+            </a:r>
+            <a:r>
+              <a:rPr lang="en-US" dirty="0" smtClean="0"/>
+              <a:t>{#“Display based on Stats”}</a:t>
+            </a:r>
+          </a:p>
+          <a:p>
+            <a:pPr marL="0" indent="0">
+              <a:buNone/>
+            </a:pPr>
+            <a:r>
+              <a:rPr lang="en-US" dirty="0"/>
+              <a:t> </a:t>
+            </a:r>
+            <a:r>
+              <a:rPr lang="en-US" dirty="0" smtClean="0"/>
+              <a:t>     Class </a:t>
+            </a:r>
+            <a:r>
+              <a:rPr lang="en-US" dirty="0" err="1" smtClean="0"/>
+              <a:t>MessageFilter</a:t>
+            </a:r>
+            <a:r>
+              <a:rPr lang="en-US" dirty="0" smtClean="0"/>
+              <a:t> </a:t>
+            </a:r>
+            <a:r>
+              <a:rPr lang="en-US" dirty="0" smtClean="0"/>
+              <a:t>extends </a:t>
+            </a:r>
+            <a:r>
+              <a:rPr lang="en-US" dirty="0" err="1" smtClean="0"/>
+              <a:t>React.Component</a:t>
+            </a:r>
+            <a:r>
+              <a:rPr lang="en-US" dirty="0" smtClean="0"/>
+              <a:t>{ #“Display based on filters”}</a:t>
+            </a:r>
+          </a:p>
+          <a:p>
+            <a:pPr marL="0" indent="0">
+              <a:buNone/>
+            </a:pPr>
+            <a:r>
+              <a:rPr lang="en-US" dirty="0"/>
+              <a:t> </a:t>
+            </a:r>
+            <a:r>
+              <a:rPr lang="en-US" dirty="0" smtClean="0"/>
+              <a:t>     Class </a:t>
+            </a:r>
+            <a:r>
+              <a:rPr lang="en-US" dirty="0" err="1" smtClean="0"/>
+              <a:t>MessageScroll</a:t>
+            </a:r>
+            <a:r>
+              <a:rPr lang="en-US" dirty="0" smtClean="0"/>
+              <a:t> </a:t>
+            </a:r>
+            <a:r>
+              <a:rPr lang="en-US" dirty="0" smtClean="0"/>
+              <a:t>extends </a:t>
+            </a:r>
+            <a:r>
+              <a:rPr lang="en-US" dirty="0" err="1" smtClean="0"/>
+              <a:t>React.Component</a:t>
+            </a:r>
+            <a:r>
+              <a:rPr lang="en-US" dirty="0" smtClean="0"/>
+              <a:t> </a:t>
+            </a:r>
+            <a:r>
+              <a:rPr lang="en-US" dirty="0" smtClean="0"/>
+              <a:t>{ #“Scrolling live display”}</a:t>
+            </a:r>
+          </a:p>
+          <a:p>
+            <a:pPr marL="0" indent="0">
+              <a:buNone/>
+            </a:pPr>
+            <a:r>
+              <a:rPr lang="en-US" dirty="0" smtClean="0"/>
+              <a:t>}</a:t>
+            </a:r>
+          </a:p>
+          <a:p>
+            <a:pPr marL="0" indent="0">
+              <a:buNone/>
+            </a:pPr>
+            <a:r>
+              <a:rPr lang="en-US" dirty="0" smtClean="0"/>
+              <a:t>The messages will be state which will be passed as props into the </a:t>
+            </a:r>
+            <a:r>
+              <a:rPr lang="en-US" dirty="0" err="1" smtClean="0"/>
+              <a:t>MessageStats</a:t>
+            </a:r>
+            <a:r>
+              <a:rPr lang="en-US" dirty="0" smtClean="0"/>
+              <a:t> and </a:t>
+            </a:r>
+            <a:r>
+              <a:rPr lang="en-US" dirty="0" err="1" smtClean="0"/>
+              <a:t>MessageScroll</a:t>
+            </a:r>
+            <a:r>
+              <a:rPr lang="en-US" dirty="0" smtClean="0"/>
+              <a:t>. We need to periodically poll the server for message updates.</a:t>
+            </a:r>
+            <a:endParaRPr lang="en-US" dirty="0"/>
+          </a:p>
+        </p:txBody>
+      </p:sp>
+    </p:spTree>
+    <p:extLst>
+      <p:ext uri="{BB962C8B-B14F-4D97-AF65-F5344CB8AC3E}">
+        <p14:creationId xmlns:p14="http://schemas.microsoft.com/office/powerpoint/2010/main" val="747820534"/>
+      </p:ext>
+    </p:extLst>
+  </p:cSld>
+  <p:clrMapOvr>
+    <a:masterClrMapping/>
+  </p:clrMapOvr>
+</p:sld>
+</file>
+
 <file path=ppt/slides/slide2.xml><?xml version="1.0" encoding="utf-8"?>
 <p:sld xmlns:a="http://schemas.openxmlformats.org/drawingml/2006/main" xmlns:r="http://schemas.openxmlformats.org/officeDocument/2006/relationships" xmlns:p="http://schemas.openxmlformats.org/presentationml/2006/main">
   <p:cSld>

</xml_diff>

<commit_message>
Prezo - ver3 and simple-ui.ver1
</commit_message>
<xml_diff>
--- a/DeviceManager/CMAD_prezo.pptx
+++ b/DeviceManager/CMAD_prezo.pptx
@@ -3014,7 +3014,7 @@
           <a:bodyPr/>
           <a:lstStyle/>
           <a:p>
-            <a:endParaRPr lang="en-US"/>
+            <a:endParaRPr lang="en-US" dirty="0"/>
           </a:p>
         </p:txBody>
       </p:sp>
@@ -3187,15 +3187,7 @@
             </a:r>
             <a:r>
               <a:rPr lang="en-US" sz="6400" dirty="0" smtClean="0"/>
-              <a:t> </a:t>
-            </a:r>
-            <a:r>
-              <a:rPr lang="en-US" sz="6400" dirty="0" err="1" smtClean="0"/>
-              <a:t>SeverityIS</a:t>
-            </a:r>
-            <a:r>
-              <a:rPr lang="en-US" sz="6400" dirty="0" smtClean="0"/>
-              <a:t>: “”,</a:t>
+              <a:t> Severity: “”,</a:t>
             </a:r>
           </a:p>
           <a:p>
@@ -4799,13 +4791,21 @@
             </a:r>
             <a:r>
               <a:rPr lang="en-US" sz="4200" dirty="0" smtClean="0"/>
-              <a:t>  Spring boot based java interface which will  implement     the get/set rest APIs. Basically this server will open a well known port and listen for messages from the devices. </a:t>
-            </a:r>
-          </a:p>
-          <a:p>
+              <a:t>  Spring boot based java interface which will  implement     the get/set rest APIs</a:t>
+            </a:r>
+            <a:r>
+              <a:rPr lang="en-US" sz="4200" smtClean="0"/>
+              <a:t>. </a:t>
+            </a:r>
+          </a:p>
+          <a:p>
+            <a:r>
+              <a:rPr lang="en-US" sz="4200" smtClean="0"/>
+              <a:t>Rest </a:t>
+            </a:r>
             <a:r>
               <a:rPr lang="en-US" sz="4200" dirty="0" smtClean="0"/>
-              <a:t>Rest Controller Tier </a:t>
+              <a:t>Controller Tier </a:t>
             </a:r>
             <a:r>
               <a:rPr lang="mr-IN" sz="4200" dirty="0" smtClean="0"/>
@@ -5940,15 +5940,7 @@
             </a:pPr>
             <a:r>
               <a:rPr lang="en-US" dirty="0" smtClean="0"/>
-              <a:t>Server will do basic validation of the message and will </a:t>
-            </a:r>
-            <a:r>
-              <a:rPr lang="en-US" dirty="0" err="1" smtClean="0"/>
-              <a:t>cceptmessage</a:t>
-            </a:r>
-            <a:r>
-              <a:rPr lang="en-US" dirty="0" smtClean="0"/>
-              <a:t> into the database or </a:t>
+              <a:t>Server will do basic validation of the message and will accept message into the database or </a:t>
             </a:r>
             <a:r>
               <a:rPr lang="en-US" dirty="0" smtClean="0"/>
@@ -5999,15 +5991,7 @@
             </a:pPr>
             <a:r>
               <a:rPr lang="en-US" dirty="0" smtClean="0"/>
-              <a:t>Server </a:t>
-            </a:r>
-            <a:r>
-              <a:rPr lang="en-US" dirty="0" err="1" smtClean="0"/>
-              <a:t>acceptmessage</a:t>
-            </a:r>
-            <a:r>
-              <a:rPr lang="en-US" dirty="0" smtClean="0"/>
-              <a:t> of the format       </a:t>
+              <a:t>Server accept messages of the format       </a:t>
             </a:r>
             <a:r>
               <a:rPr lang="en-US" dirty="0" err="1" smtClean="0"/>

</xml_diff>